<commit_message>
mlmi workshop works + others
</commit_message>
<xml_diff>
--- a/miccai_figs.pptx
+++ b/miccai_figs.pptx
@@ -197,7 +197,7 @@
           <a:p>
             <a:fld id="{4FE64238-99B0-4C34-828B-0311AA730DE3}" type="datetimeFigureOut">
               <a:rPr lang="en-US" smtClean="0"/>
-              <a:t>3/16/2020</a:t>
+              <a:t>9/4/20</a:t>
             </a:fld>
             <a:endParaRPr lang="en-US"/>
           </a:p>
@@ -695,7 +695,7 @@
           <a:p>
             <a:fld id="{CFFFB865-B35C-45D0-B02E-AE1D3B45D1D4}" type="datetimeFigureOut">
               <a:rPr lang="en-US" smtClean="0"/>
-              <a:t>3/16/2020</a:t>
+              <a:t>9/4/20</a:t>
             </a:fld>
             <a:endParaRPr lang="en-US"/>
           </a:p>
@@ -893,7 +893,7 @@
           <a:p>
             <a:fld id="{CFFFB865-B35C-45D0-B02E-AE1D3B45D1D4}" type="datetimeFigureOut">
               <a:rPr lang="en-US" smtClean="0"/>
-              <a:t>3/16/2020</a:t>
+              <a:t>9/4/20</a:t>
             </a:fld>
             <a:endParaRPr lang="en-US"/>
           </a:p>
@@ -1101,7 +1101,7 @@
           <a:p>
             <a:fld id="{CFFFB865-B35C-45D0-B02E-AE1D3B45D1D4}" type="datetimeFigureOut">
               <a:rPr lang="en-US" smtClean="0"/>
-              <a:t>3/16/2020</a:t>
+              <a:t>9/4/20</a:t>
             </a:fld>
             <a:endParaRPr lang="en-US"/>
           </a:p>
@@ -1299,7 +1299,7 @@
           <a:p>
             <a:fld id="{CFFFB865-B35C-45D0-B02E-AE1D3B45D1D4}" type="datetimeFigureOut">
               <a:rPr lang="en-US" smtClean="0"/>
-              <a:t>3/16/2020</a:t>
+              <a:t>9/4/20</a:t>
             </a:fld>
             <a:endParaRPr lang="en-US"/>
           </a:p>
@@ -1574,7 +1574,7 @@
           <a:p>
             <a:fld id="{CFFFB865-B35C-45D0-B02E-AE1D3B45D1D4}" type="datetimeFigureOut">
               <a:rPr lang="en-US" smtClean="0"/>
-              <a:t>3/16/2020</a:t>
+              <a:t>9/4/20</a:t>
             </a:fld>
             <a:endParaRPr lang="en-US"/>
           </a:p>
@@ -1839,7 +1839,7 @@
           <a:p>
             <a:fld id="{CFFFB865-B35C-45D0-B02E-AE1D3B45D1D4}" type="datetimeFigureOut">
               <a:rPr lang="en-US" smtClean="0"/>
-              <a:t>3/16/2020</a:t>
+              <a:t>9/4/20</a:t>
             </a:fld>
             <a:endParaRPr lang="en-US"/>
           </a:p>
@@ -2251,7 +2251,7 @@
           <a:p>
             <a:fld id="{CFFFB865-B35C-45D0-B02E-AE1D3B45D1D4}" type="datetimeFigureOut">
               <a:rPr lang="en-US" smtClean="0"/>
-              <a:t>3/16/2020</a:t>
+              <a:t>9/4/20</a:t>
             </a:fld>
             <a:endParaRPr lang="en-US"/>
           </a:p>
@@ -2392,7 +2392,7 @@
           <a:p>
             <a:fld id="{CFFFB865-B35C-45D0-B02E-AE1D3B45D1D4}" type="datetimeFigureOut">
               <a:rPr lang="en-US" smtClean="0"/>
-              <a:t>3/16/2020</a:t>
+              <a:t>9/4/20</a:t>
             </a:fld>
             <a:endParaRPr lang="en-US"/>
           </a:p>
@@ -2505,7 +2505,7 @@
           <a:p>
             <a:fld id="{CFFFB865-B35C-45D0-B02E-AE1D3B45D1D4}" type="datetimeFigureOut">
               <a:rPr lang="en-US" smtClean="0"/>
-              <a:t>3/16/2020</a:t>
+              <a:t>9/4/20</a:t>
             </a:fld>
             <a:endParaRPr lang="en-US"/>
           </a:p>
@@ -2816,7 +2816,7 @@
           <a:p>
             <a:fld id="{CFFFB865-B35C-45D0-B02E-AE1D3B45D1D4}" type="datetimeFigureOut">
               <a:rPr lang="en-US" smtClean="0"/>
-              <a:t>3/16/2020</a:t>
+              <a:t>9/4/20</a:t>
             </a:fld>
             <a:endParaRPr lang="en-US"/>
           </a:p>
@@ -3104,7 +3104,7 @@
           <a:p>
             <a:fld id="{CFFFB865-B35C-45D0-B02E-AE1D3B45D1D4}" type="datetimeFigureOut">
               <a:rPr lang="en-US" smtClean="0"/>
-              <a:t>3/16/2020</a:t>
+              <a:t>9/4/20</a:t>
             </a:fld>
             <a:endParaRPr lang="en-US"/>
           </a:p>
@@ -3345,7 +3345,7 @@
           <a:p>
             <a:fld id="{CFFFB865-B35C-45D0-B02E-AE1D3B45D1D4}" type="datetimeFigureOut">
               <a:rPr lang="en-US" smtClean="0"/>
-              <a:t>3/16/2020</a:t>
+              <a:t>9/4/20</a:t>
             </a:fld>
             <a:endParaRPr lang="en-US"/>
           </a:p>
@@ -5909,7 +5909,7 @@
             <a:prstGeom prst="bentConnector4">
               <a:avLst>
                 <a:gd name="adj1" fmla="val 463"/>
-                <a:gd name="adj2" fmla="val -5042"/>
+                <a:gd name="adj2" fmla="val -11577"/>
               </a:avLst>
             </a:prstGeom>
             <a:ln>

</xml_diff>